<commit_message>
working with part 2
</commit_message>
<xml_diff>
--- a/20242-NLP-LLM/lecture notes/Part 2 - Introduction to Large Language Models/Part 2 - Introduction to Large Language Models.pptx
+++ b/20242-NLP-LLM/lecture notes/Part 2 - Introduction to Large Language Models/Part 2 - Introduction to Large Language Models.pptx
@@ -176,7 +176,7 @@
 <file path=ppt/revisionInfo.xml><?xml version="1.0" encoding="utf-8"?>
 <p1510:revInfo xmlns:a="http://schemas.openxmlformats.org/drawingml/2006/main" xmlns:r="http://schemas.openxmlformats.org/officeDocument/2006/relationships" xmlns:p1510="http://schemas.microsoft.com/office/powerpoint/2015/10/main">
   <p1510:revLst>
-    <p1510:client id="{E5645173-9704-44B4-82F5-EF2938BAEEFE}" v="152" dt="2025-04-21T16:55:26.856"/>
+    <p1510:client id="{E5645173-9704-44B4-82F5-EF2938BAEEFE}" v="155" dt="2025-04-21T17:05:20.196"/>
   </p1510:revLst>
 </p1510:revInfo>
 </file>
@@ -1456,7 +1456,7 @@
   <pc:docChgLst>
     <pc:chgData name="Mohammed Fasha" userId="cc64f42d-a1a6-4f08-b97b-0c37f877119f" providerId="ADAL" clId="{E5645173-9704-44B4-82F5-EF2938BAEEFE}"/>
     <pc:docChg chg="undo redo custSel addSld delSld modSld sldOrd modMainMaster">
-      <pc:chgData name="Mohammed Fasha" userId="cc64f42d-a1a6-4f08-b97b-0c37f877119f" providerId="ADAL" clId="{E5645173-9704-44B4-82F5-EF2938BAEEFE}" dt="2025-04-21T16:55:26.856" v="2132" actId="1076"/>
+      <pc:chgData name="Mohammed Fasha" userId="cc64f42d-a1a6-4f08-b97b-0c37f877119f" providerId="ADAL" clId="{E5645173-9704-44B4-82F5-EF2938BAEEFE}" dt="2025-04-21T17:06:00.103" v="2138" actId="47"/>
       <pc:docMkLst>
         <pc:docMk/>
       </pc:docMkLst>
@@ -3367,7 +3367,7 @@
         </pc:picChg>
       </pc:sldChg>
       <pc:sldChg chg="addSp delSp modSp mod">
-        <pc:chgData name="Mohammed Fasha" userId="cc64f42d-a1a6-4f08-b97b-0c37f877119f" providerId="ADAL" clId="{E5645173-9704-44B4-82F5-EF2938BAEEFE}" dt="2025-04-20T04:43:55.750" v="1837"/>
+        <pc:chgData name="Mohammed Fasha" userId="cc64f42d-a1a6-4f08-b97b-0c37f877119f" providerId="ADAL" clId="{E5645173-9704-44B4-82F5-EF2938BAEEFE}" dt="2025-04-21T16:57:23.128" v="2134"/>
         <pc:sldMkLst>
           <pc:docMk/>
           <pc:sldMk cId="2121122174" sldId="539"/>
@@ -3381,7 +3381,7 @@
           </ac:spMkLst>
         </pc:spChg>
         <pc:picChg chg="add mod">
-          <ac:chgData name="Mohammed Fasha" userId="cc64f42d-a1a6-4f08-b97b-0c37f877119f" providerId="ADAL" clId="{E5645173-9704-44B4-82F5-EF2938BAEEFE}" dt="2025-04-20T04:43:55.750" v="1837"/>
+          <ac:chgData name="Mohammed Fasha" userId="cc64f42d-a1a6-4f08-b97b-0c37f877119f" providerId="ADAL" clId="{E5645173-9704-44B4-82F5-EF2938BAEEFE}" dt="2025-04-21T16:57:23.128" v="2134"/>
           <ac:picMkLst>
             <pc:docMk/>
             <pc:sldMk cId="2121122174" sldId="539"/>
@@ -4292,6 +4292,21 @@
           </ac:picMkLst>
         </pc:picChg>
       </pc:sldChg>
+      <pc:sldChg chg="modSp">
+        <pc:chgData name="Mohammed Fasha" userId="cc64f42d-a1a6-4f08-b97b-0c37f877119f" providerId="ADAL" clId="{E5645173-9704-44B4-82F5-EF2938BAEEFE}" dt="2025-04-21T16:57:15.823" v="2133"/>
+        <pc:sldMkLst>
+          <pc:docMk/>
+          <pc:sldMk cId="1424455440" sldId="590"/>
+        </pc:sldMkLst>
+        <pc:picChg chg="mod">
+          <ac:chgData name="Mohammed Fasha" userId="cc64f42d-a1a6-4f08-b97b-0c37f877119f" providerId="ADAL" clId="{E5645173-9704-44B4-82F5-EF2938BAEEFE}" dt="2025-04-21T16:57:15.823" v="2133"/>
+          <ac:picMkLst>
+            <pc:docMk/>
+            <pc:sldMk cId="1424455440" sldId="590"/>
+            <ac:picMk id="4" creationId="{81ED0918-EFDF-D0FD-4997-439B42B617BC}"/>
+          </ac:picMkLst>
+        </pc:picChg>
+      </pc:sldChg>
       <pc:sldChg chg="addSp delSp modSp new mod">
         <pc:chgData name="Mohammed Fasha" userId="cc64f42d-a1a6-4f08-b97b-0c37f877119f" providerId="ADAL" clId="{E5645173-9704-44B4-82F5-EF2938BAEEFE}" dt="2025-04-20T05:15:59.312" v="1992" actId="20577"/>
         <pc:sldMkLst>
@@ -4661,6 +4676,29 @@
             <pc:docMk/>
             <pc:sldMk cId="894222825" sldId="594"/>
             <ac:picMk id="5" creationId="{C4B34278-2B06-282C-365A-D63A5CEC5425}"/>
+          </ac:picMkLst>
+        </pc:picChg>
+      </pc:sldChg>
+      <pc:sldChg chg="addSp delSp modSp new del mod">
+        <pc:chgData name="Mohammed Fasha" userId="cc64f42d-a1a6-4f08-b97b-0c37f877119f" providerId="ADAL" clId="{E5645173-9704-44B4-82F5-EF2938BAEEFE}" dt="2025-04-21T17:06:00.103" v="2138" actId="47"/>
+        <pc:sldMkLst>
+          <pc:docMk/>
+          <pc:sldMk cId="4145332107" sldId="594"/>
+        </pc:sldMkLst>
+        <pc:spChg chg="del">
+          <ac:chgData name="Mohammed Fasha" userId="cc64f42d-a1a6-4f08-b97b-0c37f877119f" providerId="ADAL" clId="{E5645173-9704-44B4-82F5-EF2938BAEEFE}" dt="2025-04-21T17:05:15.130" v="2136" actId="22"/>
+          <ac:spMkLst>
+            <pc:docMk/>
+            <pc:sldMk cId="4145332107" sldId="594"/>
+            <ac:spMk id="3" creationId="{E1C97B7D-66BF-524B-4655-870AC5F7FD01}"/>
+          </ac:spMkLst>
+        </pc:spChg>
+        <pc:picChg chg="add mod ord">
+          <ac:chgData name="Mohammed Fasha" userId="cc64f42d-a1a6-4f08-b97b-0c37f877119f" providerId="ADAL" clId="{E5645173-9704-44B4-82F5-EF2938BAEEFE}" dt="2025-04-21T17:05:20.196" v="2137"/>
+          <ac:picMkLst>
+            <pc:docMk/>
+            <pc:sldMk cId="4145332107" sldId="594"/>
+            <ac:picMk id="5" creationId="{75DD0B13-BD66-D754-8418-804DC5EAC223}"/>
           </ac:picMkLst>
         </pc:picChg>
       </pc:sldChg>

</xml_diff>